<commit_message>
Updates to lectures and assignments
</commit_message>
<xml_diff>
--- a/classes/winter_2023/lectures/lecture_02-elements-of-closed-loop-systems/elements_of_closed_loop_systems.pptx
+++ b/classes/winter_2023/lectures/lecture_02-elements-of-closed-loop-systems/elements_of_closed_loop_systems.pptx
@@ -31424,7 +31424,7 @@
         <p:spPr>
           <a:xfrm>
             <a:off x="388880" y="3716928"/>
-            <a:ext cx="2207656" cy="400110"/>
+            <a:ext cx="4158511" cy="400110"/>
           </a:xfrm>
           <a:prstGeom prst="rect">
             <a:avLst/>
@@ -31439,7 +31439,7 @@
           <a:p>
             <a:r>
               <a:rPr lang="en-US" sz="2000" b="1" dirty="0"/>
-              <a:t>Continuous time</a:t>
+              <a:t>Continuous time state equations</a:t>
             </a:r>
           </a:p>
         </p:txBody>
@@ -31461,7 +31461,7 @@
             <p:spPr>
               <a:xfrm>
                 <a:off x="415160" y="4174303"/>
-                <a:ext cx="2811539" cy="597279"/>
+                <a:ext cx="1756956" cy="307777"/>
               </a:xfrm>
               <a:prstGeom prst="rect">
                 <a:avLst/>
@@ -31481,48 +31481,24 @@
                       <m:jc m:val="centerGroup"/>
                     </m:oMathParaPr>
                     <m:oMath xmlns:m="http://schemas.openxmlformats.org/officeDocument/2006/math">
-                      <m:f>
-                        <m:fPr>
+                      <m:acc>
+                        <m:accPr>
+                          <m:chr m:val="̇"/>
                           <m:ctrlPr>
                             <a:rPr lang="en-US" sz="2000" b="0" i="1" smtClean="0">
                               <a:latin typeface="Cambria Math" panose="02040503050406030204" pitchFamily="18" charset="0"/>
                             </a:rPr>
                           </m:ctrlPr>
-                        </m:fPr>
-                        <m:num>
+                        </m:accPr>
+                        <m:e>
                           <m:r>
                             <a:rPr lang="en-US" sz="2000" b="0" i="1" smtClean="0">
                               <a:latin typeface="Cambria Math" panose="02040503050406030204" pitchFamily="18" charset="0"/>
                             </a:rPr>
-                            <m:t>𝑑𝑦</m:t>
+                            <m:t>𝑥</m:t>
                           </m:r>
-                          <m:d>
-                            <m:dPr>
-                              <m:ctrlPr>
-                                <a:rPr lang="en-US" sz="2000" b="0" i="1" smtClean="0">
-                                  <a:latin typeface="Cambria Math" panose="02040503050406030204" pitchFamily="18" charset="0"/>
-                                </a:rPr>
-                              </m:ctrlPr>
-                            </m:dPr>
-                            <m:e>
-                              <m:r>
-                                <a:rPr lang="en-US" sz="2000" b="0" i="1" smtClean="0">
-                                  <a:latin typeface="Cambria Math" panose="02040503050406030204" pitchFamily="18" charset="0"/>
-                                </a:rPr>
-                                <m:t>𝑡</m:t>
-                              </m:r>
-                            </m:e>
-                          </m:d>
-                        </m:num>
-                        <m:den>
-                          <m:r>
-                            <a:rPr lang="en-US" sz="2000" b="0" i="1" smtClean="0">
-                              <a:latin typeface="Cambria Math" panose="02040503050406030204" pitchFamily="18" charset="0"/>
-                            </a:rPr>
-                            <m:t>𝑑𝑡</m:t>
-                          </m:r>
-                        </m:den>
-                      </m:f>
+                        </m:e>
+                      </m:acc>
                       <m:r>
                         <a:rPr lang="en-US" sz="2000" b="0" i="1" smtClean="0">
                           <a:latin typeface="Cambria Math" panose="02040503050406030204" pitchFamily="18" charset="0"/>
@@ -31566,25 +31542,8 @@
                         <a:rPr lang="en-US" sz="2000" b="0" i="1" smtClean="0">
                           <a:latin typeface="Cambria Math" panose="02040503050406030204" pitchFamily="18" charset="0"/>
                         </a:rPr>
-                        <m:t>𝑥</m:t>
+                        <m:t>𝑢</m:t>
                       </m:r>
-                      <m:d>
-                        <m:dPr>
-                          <m:ctrlPr>
-                            <a:rPr lang="en-US" sz="2000" b="0" i="1" smtClean="0">
-                              <a:latin typeface="Cambria Math" panose="02040503050406030204" pitchFamily="18" charset="0"/>
-                            </a:rPr>
-                          </m:ctrlPr>
-                        </m:dPr>
-                        <m:e>
-                          <m:r>
-                            <a:rPr lang="en-US" sz="2000" b="0" i="1" smtClean="0">
-                              <a:latin typeface="Cambria Math" panose="02040503050406030204" pitchFamily="18" charset="0"/>
-                            </a:rPr>
-                            <m:t>𝑡</m:t>
-                          </m:r>
-                        </m:e>
-                      </m:d>
                       <m:r>
                         <a:rPr lang="en-US" sz="2000" b="0" i="1" smtClean="0">
                           <a:latin typeface="Cambria Math" panose="02040503050406030204" pitchFamily="18" charset="0"/>
@@ -31628,25 +31587,13 @@
                         <a:rPr lang="en-US" sz="2000" b="0" i="1" smtClean="0">
                           <a:latin typeface="Cambria Math" panose="02040503050406030204" pitchFamily="18" charset="0"/>
                         </a:rPr>
-                        <m:t>𝑦</m:t>
+                        <m:t>𝑥</m:t>
                       </m:r>
                       <m:r>
                         <a:rPr lang="en-US" sz="2000" b="0" i="1" smtClean="0">
                           <a:latin typeface="Cambria Math" panose="02040503050406030204" pitchFamily="18" charset="0"/>
                         </a:rPr>
-                        <m:t>(</m:t>
-                      </m:r>
-                      <m:r>
-                        <a:rPr lang="en-US" sz="2000" b="0" i="1" smtClean="0">
-                          <a:latin typeface="Cambria Math" panose="02040503050406030204" pitchFamily="18" charset="0"/>
-                        </a:rPr>
-                        <m:t>𝑡</m:t>
-                      </m:r>
-                      <m:r>
-                        <a:rPr lang="en-US" sz="2000" b="0" i="1" smtClean="0">
-                          <a:latin typeface="Cambria Math" panose="02040503050406030204" pitchFamily="18" charset="0"/>
-                        </a:rPr>
-                        <m:t>)</m:t>
+                        <m:t>,</m:t>
                       </m:r>
                     </m:oMath>
                   </m:oMathPara>
@@ -31674,7 +31621,7 @@
             <p:spPr>
               <a:xfrm>
                 <a:off x="415160" y="4174303"/>
-                <a:ext cx="2811539" cy="597279"/>
+                <a:ext cx="1756956" cy="307777"/>
               </a:xfrm>
               <a:prstGeom prst="rect">
                 <a:avLst/>
@@ -31682,7 +31629,7 @@
               <a:blipFill>
                 <a:blip r:embed="rId4"/>
                 <a:stretch>
-                  <a:fillRect l="-2252" t="-2083" r="-2703" b="-14583"/>
+                  <a:fillRect l="-1439" b="-20000"/>
                 </a:stretch>
               </a:blipFill>
             </p:spPr>
@@ -31984,8 +31931,8 @@
           </a:prstGeom>
         </p:spPr>
       </p:pic>
-      <mc:AlternateContent xmlns:mc="http://schemas.openxmlformats.org/markup-compatibility/2006" xmlns:a14="http://schemas.microsoft.com/office/drawing/2010/main">
-        <mc:Choice Requires="a14">
+      <mc:AlternateContent xmlns:mc="http://schemas.openxmlformats.org/markup-compatibility/2006">
+        <mc:Choice xmlns:a14="http://schemas.microsoft.com/office/drawing/2010/main" Requires="a14">
           <p:sp>
             <p:nvSpPr>
               <p:cNvPr id="29" name="TextBox 28">
@@ -32000,7 +31947,7 @@
             </p:nvSpPr>
             <p:spPr>
               <a:xfrm>
-                <a:off x="1331885" y="4828847"/>
+                <a:off x="3030568" y="4174303"/>
                 <a:ext cx="823174" cy="307777"/>
               </a:xfrm>
               <a:prstGeom prst="rect">
@@ -32068,7 +32015,7 @@
             </p:txBody>
           </p:sp>
         </mc:Choice>
-        <mc:Fallback xmlns="">
+        <mc:Fallback>
           <p:sp>
             <p:nvSpPr>
               <p:cNvPr id="29" name="TextBox 28">
@@ -32085,7 +32032,7 @@
             </p:nvSpPr>
             <p:spPr>
               <a:xfrm>
-                <a:off x="1331885" y="4828847"/>
+                <a:off x="3030568" y="4174303"/>
                 <a:ext cx="823174" cy="307777"/>
               </a:xfrm>
               <a:prstGeom prst="rect">
@@ -32094,7 +32041,7 @@
               <a:blipFill>
                 <a:blip r:embed="rId7"/>
                 <a:stretch>
-                  <a:fillRect l="-6061" r="-6061" b="-16000"/>
+                  <a:fillRect l="-6061" r="-6061" b="-20000"/>
                 </a:stretch>
               </a:blipFill>
             </p:spPr>
@@ -32325,6 +32272,114 @@
           </a:p>
         </p:txBody>
       </p:sp>
+      <mc:AlternateContent xmlns:mc="http://schemas.openxmlformats.org/markup-compatibility/2006">
+        <mc:Choice xmlns:a14="http://schemas.microsoft.com/office/drawing/2010/main" Requires="a14">
+          <p:sp>
+            <p:nvSpPr>
+              <p:cNvPr id="23" name="TextBox 22">
+                <a:extLst>
+                  <a:ext uri="{FF2B5EF4-FFF2-40B4-BE49-F238E27FC236}">
+                    <a16:creationId xmlns:a16="http://schemas.microsoft.com/office/drawing/2014/main" id="{4E0EB344-A860-4AE7-F39B-22171D0C4CBE}"/>
+                  </a:ext>
+                </a:extLst>
+              </p:cNvPr>
+              <p:cNvSpPr txBox="1"/>
+              <p:nvPr/>
+            </p:nvSpPr>
+            <p:spPr>
+              <a:xfrm>
+                <a:off x="447804" y="4546805"/>
+                <a:ext cx="698012" cy="307777"/>
+              </a:xfrm>
+              <a:prstGeom prst="rect">
+                <a:avLst/>
+              </a:prstGeom>
+              <a:noFill/>
+            </p:spPr>
+            <p:txBody>
+              <a:bodyPr wrap="none" lIns="0" tIns="0" rIns="0" bIns="0" rtlCol="0">
+                <a:spAutoFit/>
+              </a:bodyPr>
+              <a:lstStyle/>
+              <a:p>
+                <a:pPr/>
+                <a14:m>
+                  <m:oMathPara xmlns:m="http://schemas.openxmlformats.org/officeDocument/2006/math">
+                    <m:oMathParaPr>
+                      <m:jc m:val="centerGroup"/>
+                    </m:oMathParaPr>
+                    <m:oMath xmlns:m="http://schemas.openxmlformats.org/officeDocument/2006/math">
+                      <m:r>
+                        <a:rPr lang="en-US" sz="2000" b="0" i="1" smtClean="0">
+                          <a:latin typeface="Cambria Math" panose="02040503050406030204" pitchFamily="18" charset="0"/>
+                        </a:rPr>
+                        <m:t>𝑦</m:t>
+                      </m:r>
+                      <m:r>
+                        <a:rPr lang="en-US" sz="2000" b="0" i="1" smtClean="0">
+                          <a:latin typeface="Cambria Math" panose="02040503050406030204" pitchFamily="18" charset="0"/>
+                        </a:rPr>
+                        <m:t>=</m:t>
+                      </m:r>
+                      <m:r>
+                        <a:rPr lang="en-US" sz="2000" b="0" i="1" smtClean="0">
+                          <a:latin typeface="Cambria Math" panose="02040503050406030204" pitchFamily="18" charset="0"/>
+                        </a:rPr>
+                        <m:t>𝑥</m:t>
+                      </m:r>
+                    </m:oMath>
+                  </m:oMathPara>
+                </a14:m>
+                <a:endParaRPr lang="en-US" sz="2000" dirty="0"/>
+              </a:p>
+            </p:txBody>
+          </p:sp>
+        </mc:Choice>
+        <mc:Fallback>
+          <p:sp>
+            <p:nvSpPr>
+              <p:cNvPr id="23" name="TextBox 22">
+                <a:extLst>
+                  <a:ext uri="{FF2B5EF4-FFF2-40B4-BE49-F238E27FC236}">
+                    <a16:creationId xmlns:a16="http://schemas.microsoft.com/office/drawing/2014/main" id="{4E0EB344-A860-4AE7-F39B-22171D0C4CBE}"/>
+                  </a:ext>
+                </a:extLst>
+              </p:cNvPr>
+              <p:cNvSpPr txBox="1">
+                <a:spLocks noRot="1" noChangeAspect="1" noMove="1" noResize="1" noEditPoints="1" noAdjustHandles="1" noChangeArrowheads="1" noChangeShapeType="1" noTextEdit="1"/>
+              </p:cNvSpPr>
+              <p:nvPr/>
+            </p:nvSpPr>
+            <p:spPr>
+              <a:xfrm>
+                <a:off x="447804" y="4546805"/>
+                <a:ext cx="698012" cy="307777"/>
+              </a:xfrm>
+              <a:prstGeom prst="rect">
+                <a:avLst/>
+              </a:prstGeom>
+              <a:blipFill>
+                <a:blip r:embed="rId9"/>
+                <a:stretch>
+                  <a:fillRect l="-7143" r="-1786" b="-20000"/>
+                </a:stretch>
+              </a:blipFill>
+            </p:spPr>
+            <p:txBody>
+              <a:bodyPr/>
+              <a:lstStyle/>
+              <a:p>
+                <a:r>
+                  <a:rPr lang="en-US">
+                    <a:noFill/>
+                  </a:rPr>
+                  <a:t> </a:t>
+                </a:r>
+              </a:p>
+            </p:txBody>
+          </p:sp>
+        </mc:Fallback>
+      </mc:AlternateContent>
     </p:spTree>
     <p:extLst>
       <p:ext uri="{BB962C8B-B14F-4D97-AF65-F5344CB8AC3E}">
@@ -32625,6 +32680,33 @@
                                   </p:childTnLst>
                                 </p:cTn>
                               </p:par>
+                              <p:par>
+                                <p:cTn id="27" presetID="1" presetClass="entr" presetSubtype="0" fill="hold" grpId="0" nodeType="withEffect">
+                                  <p:stCondLst>
+                                    <p:cond delay="0"/>
+                                  </p:stCondLst>
+                                  <p:childTnLst>
+                                    <p:set>
+                                      <p:cBhvr>
+                                        <p:cTn id="28" dur="1" fill="hold">
+                                          <p:stCondLst>
+                                            <p:cond delay="0"/>
+                                          </p:stCondLst>
+                                        </p:cTn>
+                                        <p:tgtEl>
+                                          <p:spTgt spid="23"/>
+                                        </p:tgtEl>
+                                        <p:attrNameLst>
+                                          <p:attrName>style.visibility</p:attrName>
+                                        </p:attrNameLst>
+                                      </p:cBhvr>
+                                      <p:to>
+                                        <p:strVal val="visible"/>
+                                      </p:to>
+                                    </p:set>
+                                  </p:childTnLst>
+                                </p:cTn>
+                              </p:par>
                             </p:childTnLst>
                           </p:cTn>
                         </p:par>
@@ -32660,6 +32742,7 @@
       <p:bldP spid="29" grpId="0"/>
       <p:bldP spid="30" grpId="0"/>
       <p:bldP spid="31" grpId="0" animBg="1"/>
+      <p:bldP spid="23" grpId="0"/>
     </p:bldLst>
   </p:timing>
 </p:sld>

</xml_diff>